<commit_message>
add high level architecture
</commit_message>
<xml_diff>
--- a/assets/showcase/High-level-app-relationship.pptx
+++ b/assets/showcase/High-level-app-relationship.pptx
@@ -6,6 +6,7 @@
   </p:sldMasterIdLst>
   <p:sldIdLst>
     <p:sldId id="256" r:id="rId2"/>
+    <p:sldId id="257" r:id="rId3"/>
   </p:sldIdLst>
   <p:sldSz cx="12192000" cy="6858000"/>
   <p:notesSz cx="6858000" cy="9144000"/>
@@ -104,6 +105,11 @@
       </a:defRPr>
     </a:lvl9pPr>
   </p:defaultTextStyle>
+  <p:extLst>
+    <p:ext uri="{EFAFB233-063F-42B5-8137-9DF3F51BA10A}">
+      <p15:sldGuideLst xmlns:p15="http://schemas.microsoft.com/office/powerpoint/2012/main"/>
+    </p:ext>
+  </p:extLst>
 </p:presentation>
 </file>
 
@@ -704,7 +710,7 @@
           <a:p>
             <a:fld id="{3117CEFE-FB38-4A7F-87EE-4AED51E83682}" type="datetimeFigureOut">
               <a:rPr lang="en-US" smtClean="0"/>
-              <a:t>2/15/2020</a:t>
+              <a:t>2/18/2020</a:t>
             </a:fld>
             <a:endParaRPr lang="en-US"/>
           </a:p>
@@ -902,7 +908,7 @@
           <a:p>
             <a:fld id="{3117CEFE-FB38-4A7F-87EE-4AED51E83682}" type="datetimeFigureOut">
               <a:rPr lang="en-US" smtClean="0"/>
-              <a:t>2/15/2020</a:t>
+              <a:t>2/18/2020</a:t>
             </a:fld>
             <a:endParaRPr lang="en-US"/>
           </a:p>
@@ -1110,7 +1116,7 @@
           <a:p>
             <a:fld id="{3117CEFE-FB38-4A7F-87EE-4AED51E83682}" type="datetimeFigureOut">
               <a:rPr lang="en-US" smtClean="0"/>
-              <a:t>2/15/2020</a:t>
+              <a:t>2/18/2020</a:t>
             </a:fld>
             <a:endParaRPr lang="en-US"/>
           </a:p>
@@ -1308,7 +1314,7 @@
           <a:p>
             <a:fld id="{3117CEFE-FB38-4A7F-87EE-4AED51E83682}" type="datetimeFigureOut">
               <a:rPr lang="en-US" smtClean="0"/>
-              <a:t>2/15/2020</a:t>
+              <a:t>2/18/2020</a:t>
             </a:fld>
             <a:endParaRPr lang="en-US"/>
           </a:p>
@@ -1583,7 +1589,7 @@
           <a:p>
             <a:fld id="{3117CEFE-FB38-4A7F-87EE-4AED51E83682}" type="datetimeFigureOut">
               <a:rPr lang="en-US" smtClean="0"/>
-              <a:t>2/15/2020</a:t>
+              <a:t>2/18/2020</a:t>
             </a:fld>
             <a:endParaRPr lang="en-US"/>
           </a:p>
@@ -1848,7 +1854,7 @@
           <a:p>
             <a:fld id="{3117CEFE-FB38-4A7F-87EE-4AED51E83682}" type="datetimeFigureOut">
               <a:rPr lang="en-US" smtClean="0"/>
-              <a:t>2/15/2020</a:t>
+              <a:t>2/18/2020</a:t>
             </a:fld>
             <a:endParaRPr lang="en-US"/>
           </a:p>
@@ -2260,7 +2266,7 @@
           <a:p>
             <a:fld id="{3117CEFE-FB38-4A7F-87EE-4AED51E83682}" type="datetimeFigureOut">
               <a:rPr lang="en-US" smtClean="0"/>
-              <a:t>2/15/2020</a:t>
+              <a:t>2/18/2020</a:t>
             </a:fld>
             <a:endParaRPr lang="en-US"/>
           </a:p>
@@ -2401,7 +2407,7 @@
           <a:p>
             <a:fld id="{3117CEFE-FB38-4A7F-87EE-4AED51E83682}" type="datetimeFigureOut">
               <a:rPr lang="en-US" smtClean="0"/>
-              <a:t>2/15/2020</a:t>
+              <a:t>2/18/2020</a:t>
             </a:fld>
             <a:endParaRPr lang="en-US"/>
           </a:p>
@@ -2514,7 +2520,7 @@
           <a:p>
             <a:fld id="{3117CEFE-FB38-4A7F-87EE-4AED51E83682}" type="datetimeFigureOut">
               <a:rPr lang="en-US" smtClean="0"/>
-              <a:t>2/15/2020</a:t>
+              <a:t>2/18/2020</a:t>
             </a:fld>
             <a:endParaRPr lang="en-US"/>
           </a:p>
@@ -2825,7 +2831,7 @@
           <a:p>
             <a:fld id="{3117CEFE-FB38-4A7F-87EE-4AED51E83682}" type="datetimeFigureOut">
               <a:rPr lang="en-US" smtClean="0"/>
-              <a:t>2/15/2020</a:t>
+              <a:t>2/18/2020</a:t>
             </a:fld>
             <a:endParaRPr lang="en-US"/>
           </a:p>
@@ -3113,7 +3119,7 @@
           <a:p>
             <a:fld id="{3117CEFE-FB38-4A7F-87EE-4AED51E83682}" type="datetimeFigureOut">
               <a:rPr lang="en-US" smtClean="0"/>
-              <a:t>2/15/2020</a:t>
+              <a:t>2/18/2020</a:t>
             </a:fld>
             <a:endParaRPr lang="en-US"/>
           </a:p>
@@ -3354,7 +3360,7 @@
           <a:p>
             <a:fld id="{3117CEFE-FB38-4A7F-87EE-4AED51E83682}" type="datetimeFigureOut">
               <a:rPr lang="en-US" smtClean="0"/>
-              <a:t>2/15/2020</a:t>
+              <a:t>2/18/2020</a:t>
             </a:fld>
             <a:endParaRPr lang="en-US"/>
           </a:p>
@@ -3819,8 +3825,8 @@
           <a:chExt cx="0" cy="0"/>
         </a:xfrm>
       </p:grpSpPr>
-      <mc:AlternateContent xmlns:mc="http://schemas.openxmlformats.org/markup-compatibility/2006">
-        <mc:Choice xmlns:p14="http://schemas.microsoft.com/office/powerpoint/2010/main" Requires="p14">
+      <mc:AlternateContent xmlns:mc="http://schemas.openxmlformats.org/markup-compatibility/2006" xmlns:p14="http://schemas.microsoft.com/office/powerpoint/2010/main">
+        <mc:Choice Requires="p14">
           <p:contentPart p14:bwMode="auto" r:id="rId2">
             <p14:nvContentPartPr>
               <p14:cNvPr id="6" name="Ink 5">
@@ -3839,7 +3845,7 @@
             </p14:xfrm>
           </p:contentPart>
         </mc:Choice>
-        <mc:Fallback>
+        <mc:Fallback xmlns="">
           <p:pic>
             <p:nvPicPr>
               <p:cNvPr id="6" name="Ink 5">
@@ -3870,8 +3876,8 @@
           </p:pic>
         </mc:Fallback>
       </mc:AlternateContent>
-      <mc:AlternateContent xmlns:mc="http://schemas.openxmlformats.org/markup-compatibility/2006">
-        <mc:Choice xmlns:p14="http://schemas.microsoft.com/office/powerpoint/2010/main" Requires="p14">
+      <mc:AlternateContent xmlns:mc="http://schemas.openxmlformats.org/markup-compatibility/2006" xmlns:p14="http://schemas.microsoft.com/office/powerpoint/2010/main">
+        <mc:Choice Requires="p14">
           <p:contentPart p14:bwMode="auto" r:id="rId4">
             <p14:nvContentPartPr>
               <p14:cNvPr id="19" name="Ink 18">
@@ -3890,7 +3896,7 @@
             </p14:xfrm>
           </p:contentPart>
         </mc:Choice>
-        <mc:Fallback>
+        <mc:Fallback xmlns="">
           <p:pic>
             <p:nvPicPr>
               <p:cNvPr id="19" name="Ink 18">
@@ -3921,8 +3927,8 @@
           </p:pic>
         </mc:Fallback>
       </mc:AlternateContent>
-      <mc:AlternateContent xmlns:mc="http://schemas.openxmlformats.org/markup-compatibility/2006">
-        <mc:Choice xmlns:p14="http://schemas.microsoft.com/office/powerpoint/2010/main" xmlns:aink="http://schemas.microsoft.com/office/drawing/2016/ink" Requires="p14 aink">
+      <mc:AlternateContent xmlns:mc="http://schemas.openxmlformats.org/markup-compatibility/2006" xmlns:p14="http://schemas.microsoft.com/office/powerpoint/2010/main" xmlns:aink="http://schemas.microsoft.com/office/drawing/2016/ink">
+        <mc:Choice Requires="p14 aink">
           <p:contentPart p14:bwMode="auto" r:id="rId6">
             <p14:nvContentPartPr>
               <p14:cNvPr id="28" name="Ink 27">
@@ -3941,7 +3947,7 @@
             </p14:xfrm>
           </p:contentPart>
         </mc:Choice>
-        <mc:Fallback>
+        <mc:Fallback xmlns="">
           <p:pic>
             <p:nvPicPr>
               <p:cNvPr id="28" name="Ink 27">
@@ -3972,8 +3978,8 @@
           </p:pic>
         </mc:Fallback>
       </mc:AlternateContent>
-      <mc:AlternateContent xmlns:mc="http://schemas.openxmlformats.org/markup-compatibility/2006">
-        <mc:Choice xmlns:p14="http://schemas.microsoft.com/office/powerpoint/2010/main" xmlns:aink="http://schemas.microsoft.com/office/drawing/2016/ink" Requires="p14 aink">
+      <mc:AlternateContent xmlns:mc="http://schemas.openxmlformats.org/markup-compatibility/2006" xmlns:p14="http://schemas.microsoft.com/office/powerpoint/2010/main" xmlns:aink="http://schemas.microsoft.com/office/drawing/2016/ink">
+        <mc:Choice Requires="p14 aink">
           <p:contentPart p14:bwMode="auto" r:id="rId8">
             <p14:nvContentPartPr>
               <p14:cNvPr id="31" name="Ink 30">
@@ -3992,7 +3998,7 @@
             </p14:xfrm>
           </p:contentPart>
         </mc:Choice>
-        <mc:Fallback>
+        <mc:Fallback xmlns="">
           <p:pic>
             <p:nvPicPr>
               <p:cNvPr id="31" name="Ink 30">
@@ -4023,8 +4029,8 @@
           </p:pic>
         </mc:Fallback>
       </mc:AlternateContent>
-      <mc:AlternateContent xmlns:mc="http://schemas.openxmlformats.org/markup-compatibility/2006">
-        <mc:Choice xmlns:p14="http://schemas.microsoft.com/office/powerpoint/2010/main" xmlns:aink="http://schemas.microsoft.com/office/drawing/2016/ink" Requires="p14 aink">
+      <mc:AlternateContent xmlns:mc="http://schemas.openxmlformats.org/markup-compatibility/2006" xmlns:p14="http://schemas.microsoft.com/office/powerpoint/2010/main" xmlns:aink="http://schemas.microsoft.com/office/drawing/2016/ink">
+        <mc:Choice Requires="p14 aink">
           <p:contentPart p14:bwMode="auto" r:id="rId10">
             <p14:nvContentPartPr>
               <p14:cNvPr id="32" name="Ink 31">
@@ -4043,7 +4049,7 @@
             </p14:xfrm>
           </p:contentPart>
         </mc:Choice>
-        <mc:Fallback>
+        <mc:Fallback xmlns="">
           <p:pic>
             <p:nvPicPr>
               <p:cNvPr id="32" name="Ink 31">
@@ -4253,8 +4259,8 @@
           </a:p>
         </p:txBody>
       </p:sp>
-      <mc:AlternateContent xmlns:mc="http://schemas.openxmlformats.org/markup-compatibility/2006">
-        <mc:Choice xmlns:p14="http://schemas.microsoft.com/office/powerpoint/2010/main" Requires="p14">
+      <mc:AlternateContent xmlns:mc="http://schemas.openxmlformats.org/markup-compatibility/2006" xmlns:p14="http://schemas.microsoft.com/office/powerpoint/2010/main">
+        <mc:Choice Requires="p14">
           <p:contentPart p14:bwMode="auto" r:id="rId12">
             <p14:nvContentPartPr>
               <p14:cNvPr id="46" name="Ink 45">
@@ -4273,7 +4279,7 @@
             </p14:xfrm>
           </p:contentPart>
         </mc:Choice>
-        <mc:Fallback>
+        <mc:Fallback xmlns="">
           <p:pic>
             <p:nvPicPr>
               <p:cNvPr id="46" name="Ink 45">
@@ -4304,8 +4310,8 @@
           </p:pic>
         </mc:Fallback>
       </mc:AlternateContent>
-      <mc:AlternateContent xmlns:mc="http://schemas.openxmlformats.org/markup-compatibility/2006">
-        <mc:Choice xmlns:p14="http://schemas.microsoft.com/office/powerpoint/2010/main" Requires="p14">
+      <mc:AlternateContent xmlns:mc="http://schemas.openxmlformats.org/markup-compatibility/2006" xmlns:p14="http://schemas.microsoft.com/office/powerpoint/2010/main">
+        <mc:Choice Requires="p14">
           <p:contentPart p14:bwMode="auto" r:id="rId14">
             <p14:nvContentPartPr>
               <p14:cNvPr id="47" name="Ink 46">
@@ -4324,7 +4330,7 @@
             </p14:xfrm>
           </p:contentPart>
         </mc:Choice>
-        <mc:Fallback>
+        <mc:Fallback xmlns="">
           <p:pic>
             <p:nvPicPr>
               <p:cNvPr id="47" name="Ink 46">
@@ -4355,8 +4361,8 @@
           </p:pic>
         </mc:Fallback>
       </mc:AlternateContent>
-      <mc:AlternateContent xmlns:mc="http://schemas.openxmlformats.org/markup-compatibility/2006">
-        <mc:Choice xmlns:p14="http://schemas.microsoft.com/office/powerpoint/2010/main" Requires="p14">
+      <mc:AlternateContent xmlns:mc="http://schemas.openxmlformats.org/markup-compatibility/2006" xmlns:p14="http://schemas.microsoft.com/office/powerpoint/2010/main">
+        <mc:Choice Requires="p14">
           <p:contentPart p14:bwMode="auto" r:id="rId16">
             <p14:nvContentPartPr>
               <p14:cNvPr id="48" name="Ink 47">
@@ -4375,7 +4381,7 @@
             </p14:xfrm>
           </p:contentPart>
         </mc:Choice>
-        <mc:Fallback>
+        <mc:Fallback xmlns="">
           <p:pic>
             <p:nvPicPr>
               <p:cNvPr id="48" name="Ink 47">
@@ -4406,8 +4412,8 @@
           </p:pic>
         </mc:Fallback>
       </mc:AlternateContent>
-      <mc:AlternateContent xmlns:mc="http://schemas.openxmlformats.org/markup-compatibility/2006">
-        <mc:Choice xmlns:p14="http://schemas.microsoft.com/office/powerpoint/2010/main" Requires="p14">
+      <mc:AlternateContent xmlns:mc="http://schemas.openxmlformats.org/markup-compatibility/2006" xmlns:p14="http://schemas.microsoft.com/office/powerpoint/2010/main">
+        <mc:Choice Requires="p14">
           <p:contentPart p14:bwMode="auto" r:id="rId18">
             <p14:nvContentPartPr>
               <p14:cNvPr id="49" name="Ink 48">
@@ -4426,7 +4432,7 @@
             </p14:xfrm>
           </p:contentPart>
         </mc:Choice>
-        <mc:Fallback>
+        <mc:Fallback xmlns="">
           <p:pic>
             <p:nvPicPr>
               <p:cNvPr id="49" name="Ink 48">
@@ -4652,8 +4658,8 @@
           </a:p>
         </p:txBody>
       </p:sp>
-      <mc:AlternateContent xmlns:mc="http://schemas.openxmlformats.org/markup-compatibility/2006">
-        <mc:Choice xmlns:p14="http://schemas.microsoft.com/office/powerpoint/2010/main" Requires="p14">
+      <mc:AlternateContent xmlns:mc="http://schemas.openxmlformats.org/markup-compatibility/2006" xmlns:p14="http://schemas.microsoft.com/office/powerpoint/2010/main">
+        <mc:Choice Requires="p14">
           <p:contentPart p14:bwMode="auto" r:id="rId20">
             <p14:nvContentPartPr>
               <p14:cNvPr id="55" name="Ink 54">
@@ -4672,7 +4678,7 @@
             </p14:xfrm>
           </p:contentPart>
         </mc:Choice>
-        <mc:Fallback>
+        <mc:Fallback xmlns="">
           <p:pic>
             <p:nvPicPr>
               <p:cNvPr id="55" name="Ink 54">
@@ -4703,8 +4709,8 @@
           </p:pic>
         </mc:Fallback>
       </mc:AlternateContent>
-      <mc:AlternateContent xmlns:mc="http://schemas.openxmlformats.org/markup-compatibility/2006">
-        <mc:Choice xmlns:p14="http://schemas.microsoft.com/office/powerpoint/2010/main" Requires="p14">
+      <mc:AlternateContent xmlns:mc="http://schemas.openxmlformats.org/markup-compatibility/2006" xmlns:p14="http://schemas.microsoft.com/office/powerpoint/2010/main">
+        <mc:Choice Requires="p14">
           <p:contentPart p14:bwMode="auto" r:id="rId22">
             <p14:nvContentPartPr>
               <p14:cNvPr id="56" name="Ink 55">
@@ -4723,7 +4729,7 @@
             </p14:xfrm>
           </p:contentPart>
         </mc:Choice>
-        <mc:Fallback>
+        <mc:Fallback xmlns="">
           <p:pic>
             <p:nvPicPr>
               <p:cNvPr id="56" name="Ink 55">
@@ -4754,8 +4760,8 @@
           </p:pic>
         </mc:Fallback>
       </mc:AlternateContent>
-      <mc:AlternateContent xmlns:mc="http://schemas.openxmlformats.org/markup-compatibility/2006">
-        <mc:Choice xmlns:p14="http://schemas.microsoft.com/office/powerpoint/2010/main" Requires="p14">
+      <mc:AlternateContent xmlns:mc="http://schemas.openxmlformats.org/markup-compatibility/2006" xmlns:p14="http://schemas.microsoft.com/office/powerpoint/2010/main">
+        <mc:Choice Requires="p14">
           <p:contentPart p14:bwMode="auto" r:id="rId24">
             <p14:nvContentPartPr>
               <p14:cNvPr id="58" name="Ink 57">
@@ -4774,7 +4780,7 @@
             </p14:xfrm>
           </p:contentPart>
         </mc:Choice>
-        <mc:Fallback>
+        <mc:Fallback xmlns="">
           <p:pic>
             <p:nvPicPr>
               <p:cNvPr id="58" name="Ink 57">
@@ -4805,8 +4811,8 @@
           </p:pic>
         </mc:Fallback>
       </mc:AlternateContent>
-      <mc:AlternateContent xmlns:mc="http://schemas.openxmlformats.org/markup-compatibility/2006">
-        <mc:Choice xmlns:p14="http://schemas.microsoft.com/office/powerpoint/2010/main" xmlns:aink="http://schemas.microsoft.com/office/drawing/2016/ink" Requires="p14 aink">
+      <mc:AlternateContent xmlns:mc="http://schemas.openxmlformats.org/markup-compatibility/2006" xmlns:p14="http://schemas.microsoft.com/office/powerpoint/2010/main" xmlns:aink="http://schemas.microsoft.com/office/drawing/2016/ink">
+        <mc:Choice Requires="p14 aink">
           <p:contentPart p14:bwMode="auto" r:id="rId26">
             <p14:nvContentPartPr>
               <p14:cNvPr id="61" name="Ink 60">
@@ -4825,7 +4831,7 @@
             </p14:xfrm>
           </p:contentPart>
         </mc:Choice>
-        <mc:Fallback>
+        <mc:Fallback xmlns="">
           <p:pic>
             <p:nvPicPr>
               <p:cNvPr id="61" name="Ink 60">
@@ -4895,6 +4901,1019 @@
     <p:extLst>
       <p:ext uri="{BB962C8B-B14F-4D97-AF65-F5344CB8AC3E}">
         <p14:creationId xmlns:p14="http://schemas.microsoft.com/office/powerpoint/2010/main" val="153403889"/>
+      </p:ext>
+    </p:extLst>
+  </p:cSld>
+  <p:clrMapOvr>
+    <a:masterClrMapping/>
+  </p:clrMapOvr>
+</p:sld>
+</file>
+
+<file path=ppt/slides/slide2.xml><?xml version="1.0" encoding="utf-8"?>
+<p:sld xmlns:a="http://schemas.openxmlformats.org/drawingml/2006/main" xmlns:r="http://schemas.openxmlformats.org/officeDocument/2006/relationships" xmlns:p="http://schemas.openxmlformats.org/presentationml/2006/main">
+  <p:cSld>
+    <p:spTree>
+      <p:nvGrpSpPr>
+        <p:cNvPr id="1" name=""/>
+        <p:cNvGrpSpPr/>
+        <p:nvPr/>
+      </p:nvGrpSpPr>
+      <p:grpSpPr>
+        <a:xfrm>
+          <a:off x="0" y="0"/>
+          <a:ext cx="0" cy="0"/>
+          <a:chOff x="0" y="0"/>
+          <a:chExt cx="0" cy="0"/>
+        </a:xfrm>
+      </p:grpSpPr>
+      <p:sp>
+        <p:nvSpPr>
+          <p:cNvPr id="62" name="TextBox 61">
+            <a:extLst>
+              <a:ext uri="{FF2B5EF4-FFF2-40B4-BE49-F238E27FC236}">
+                <a16:creationId xmlns:a16="http://schemas.microsoft.com/office/drawing/2014/main" id="{1244546B-C8DC-411E-A8AB-B99F8630FB80}"/>
+              </a:ext>
+            </a:extLst>
+          </p:cNvPr>
+          <p:cNvSpPr txBox="1"/>
+          <p:nvPr/>
+        </p:nvSpPr>
+        <p:spPr>
+          <a:xfrm>
+            <a:off x="337003" y="261996"/>
+            <a:ext cx="4181760" cy="461665"/>
+          </a:xfrm>
+          <a:prstGeom prst="rect">
+            <a:avLst/>
+          </a:prstGeom>
+          <a:noFill/>
+        </p:spPr>
+        <p:txBody>
+          <a:bodyPr wrap="square" rtlCol="0">
+            <a:spAutoFit/>
+          </a:bodyPr>
+          <a:lstStyle/>
+          <a:p>
+            <a:r>
+              <a:rPr lang="en-US" sz="2400" b="1" dirty="0"/>
+              <a:t>High Level FE Architecture</a:t>
+            </a:r>
+          </a:p>
+        </p:txBody>
+      </p:sp>
+      <p:sp>
+        <p:nvSpPr>
+          <p:cNvPr id="2" name="Rectangle 1">
+            <a:extLst>
+              <a:ext uri="{FF2B5EF4-FFF2-40B4-BE49-F238E27FC236}">
+                <a16:creationId xmlns:a16="http://schemas.microsoft.com/office/drawing/2014/main" id="{E39BE101-62BF-4E44-A4D7-CEBB901F43E0}"/>
+              </a:ext>
+            </a:extLst>
+          </p:cNvPr>
+          <p:cNvSpPr/>
+          <p:nvPr/>
+        </p:nvSpPr>
+        <p:spPr>
+          <a:xfrm>
+            <a:off x="4621695" y="884583"/>
+            <a:ext cx="2405270" cy="596347"/>
+          </a:xfrm>
+          <a:prstGeom prst="rect">
+            <a:avLst/>
+          </a:prstGeom>
+        </p:spPr>
+        <p:style>
+          <a:lnRef idx="2">
+            <a:schemeClr val="accent1">
+              <a:shade val="50000"/>
+            </a:schemeClr>
+          </a:lnRef>
+          <a:fillRef idx="1">
+            <a:schemeClr val="accent1"/>
+          </a:fillRef>
+          <a:effectRef idx="0">
+            <a:schemeClr val="accent1"/>
+          </a:effectRef>
+          <a:fontRef idx="minor">
+            <a:schemeClr val="lt1"/>
+          </a:fontRef>
+        </p:style>
+        <p:txBody>
+          <a:bodyPr rtlCol="0" anchor="ctr"/>
+          <a:lstStyle/>
+          <a:p>
+            <a:pPr algn="ctr"/>
+            <a:r>
+              <a:rPr lang="en-US" dirty="0"/>
+              <a:t>App Header Component</a:t>
+            </a:r>
+          </a:p>
+        </p:txBody>
+      </p:sp>
+      <p:sp>
+        <p:nvSpPr>
+          <p:cNvPr id="27" name="Rectangle 26">
+            <a:extLst>
+              <a:ext uri="{FF2B5EF4-FFF2-40B4-BE49-F238E27FC236}">
+                <a16:creationId xmlns:a16="http://schemas.microsoft.com/office/drawing/2014/main" id="{DFCCD9C2-39F9-4F60-BBFF-7CD9664B4871}"/>
+              </a:ext>
+            </a:extLst>
+          </p:cNvPr>
+          <p:cNvSpPr/>
+          <p:nvPr/>
+        </p:nvSpPr>
+        <p:spPr>
+          <a:xfrm>
+            <a:off x="4621694" y="1623390"/>
+            <a:ext cx="2405270" cy="596346"/>
+          </a:xfrm>
+          <a:prstGeom prst="rect">
+            <a:avLst/>
+          </a:prstGeom>
+        </p:spPr>
+        <p:style>
+          <a:lnRef idx="2">
+            <a:schemeClr val="accent1">
+              <a:shade val="50000"/>
+            </a:schemeClr>
+          </a:lnRef>
+          <a:fillRef idx="1">
+            <a:schemeClr val="accent1"/>
+          </a:fillRef>
+          <a:effectRef idx="0">
+            <a:schemeClr val="accent1"/>
+          </a:effectRef>
+          <a:fontRef idx="minor">
+            <a:schemeClr val="lt1"/>
+          </a:fontRef>
+        </p:style>
+        <p:txBody>
+          <a:bodyPr rtlCol="0" anchor="ctr"/>
+          <a:lstStyle/>
+          <a:p>
+            <a:pPr algn="ctr"/>
+            <a:r>
+              <a:rPr lang="en-US" dirty="0"/>
+              <a:t>App Tabs Navigation Component</a:t>
+            </a:r>
+          </a:p>
+        </p:txBody>
+      </p:sp>
+      <p:sp>
+        <p:nvSpPr>
+          <p:cNvPr id="29" name="Rectangle 28">
+            <a:extLst>
+              <a:ext uri="{FF2B5EF4-FFF2-40B4-BE49-F238E27FC236}">
+                <a16:creationId xmlns:a16="http://schemas.microsoft.com/office/drawing/2014/main" id="{395D8CC7-4832-436B-9ED7-D7CA1B6DF346}"/>
+              </a:ext>
+            </a:extLst>
+          </p:cNvPr>
+          <p:cNvSpPr/>
+          <p:nvPr/>
+        </p:nvSpPr>
+        <p:spPr>
+          <a:xfrm>
+            <a:off x="4634945" y="2362196"/>
+            <a:ext cx="2405270" cy="596346"/>
+          </a:xfrm>
+          <a:prstGeom prst="rect">
+            <a:avLst/>
+          </a:prstGeom>
+        </p:spPr>
+        <p:style>
+          <a:lnRef idx="2">
+            <a:schemeClr val="accent1">
+              <a:shade val="50000"/>
+            </a:schemeClr>
+          </a:lnRef>
+          <a:fillRef idx="1">
+            <a:schemeClr val="accent1"/>
+          </a:fillRef>
+          <a:effectRef idx="0">
+            <a:schemeClr val="accent1"/>
+          </a:effectRef>
+          <a:fontRef idx="minor">
+            <a:schemeClr val="lt1"/>
+          </a:fontRef>
+        </p:style>
+        <p:txBody>
+          <a:bodyPr rtlCol="0" anchor="ctr"/>
+          <a:lstStyle/>
+          <a:p>
+            <a:pPr algn="ctr"/>
+            <a:r>
+              <a:rPr lang="en-US" dirty="0"/>
+              <a:t>Router Outlet</a:t>
+            </a:r>
+          </a:p>
+        </p:txBody>
+      </p:sp>
+      <p:sp>
+        <p:nvSpPr>
+          <p:cNvPr id="30" name="Rectangle 29">
+            <a:extLst>
+              <a:ext uri="{FF2B5EF4-FFF2-40B4-BE49-F238E27FC236}">
+                <a16:creationId xmlns:a16="http://schemas.microsoft.com/office/drawing/2014/main" id="{62FFBC77-FA89-428F-899E-047955C8954F}"/>
+              </a:ext>
+            </a:extLst>
+          </p:cNvPr>
+          <p:cNvSpPr/>
+          <p:nvPr/>
+        </p:nvSpPr>
+        <p:spPr>
+          <a:xfrm>
+            <a:off x="2551041" y="3429000"/>
+            <a:ext cx="2405270" cy="596346"/>
+          </a:xfrm>
+          <a:prstGeom prst="rect">
+            <a:avLst/>
+          </a:prstGeom>
+        </p:spPr>
+        <p:style>
+          <a:lnRef idx="2">
+            <a:schemeClr val="accent1">
+              <a:shade val="50000"/>
+            </a:schemeClr>
+          </a:lnRef>
+          <a:fillRef idx="1">
+            <a:schemeClr val="accent1"/>
+          </a:fillRef>
+          <a:effectRef idx="0">
+            <a:schemeClr val="accent1"/>
+          </a:effectRef>
+          <a:fontRef idx="minor">
+            <a:schemeClr val="lt1"/>
+          </a:fontRef>
+        </p:style>
+        <p:txBody>
+          <a:bodyPr rtlCol="0" anchor="ctr"/>
+          <a:lstStyle/>
+          <a:p>
+            <a:pPr algn="ctr"/>
+            <a:r>
+              <a:rPr lang="en-US" dirty="0"/>
+              <a:t>Employees Screen</a:t>
+            </a:r>
+          </a:p>
+        </p:txBody>
+      </p:sp>
+      <p:sp>
+        <p:nvSpPr>
+          <p:cNvPr id="36" name="Rectangle 35">
+            <a:extLst>
+              <a:ext uri="{FF2B5EF4-FFF2-40B4-BE49-F238E27FC236}">
+                <a16:creationId xmlns:a16="http://schemas.microsoft.com/office/drawing/2014/main" id="{E5497ED0-6F08-4F56-9389-7DCD91EA5E30}"/>
+              </a:ext>
+            </a:extLst>
+          </p:cNvPr>
+          <p:cNvSpPr/>
+          <p:nvPr/>
+        </p:nvSpPr>
+        <p:spPr>
+          <a:xfrm>
+            <a:off x="6470372" y="3448877"/>
+            <a:ext cx="2405270" cy="596346"/>
+          </a:xfrm>
+          <a:prstGeom prst="rect">
+            <a:avLst/>
+          </a:prstGeom>
+        </p:spPr>
+        <p:style>
+          <a:lnRef idx="2">
+            <a:schemeClr val="accent1">
+              <a:shade val="50000"/>
+            </a:schemeClr>
+          </a:lnRef>
+          <a:fillRef idx="1">
+            <a:schemeClr val="accent1"/>
+          </a:fillRef>
+          <a:effectRef idx="0">
+            <a:schemeClr val="accent1"/>
+          </a:effectRef>
+          <a:fontRef idx="minor">
+            <a:schemeClr val="lt1"/>
+          </a:fontRef>
+        </p:style>
+        <p:txBody>
+          <a:bodyPr rtlCol="0" anchor="ctr"/>
+          <a:lstStyle/>
+          <a:p>
+            <a:pPr algn="ctr"/>
+            <a:r>
+              <a:rPr lang="en-US" dirty="0"/>
+              <a:t>Managers Screen</a:t>
+            </a:r>
+          </a:p>
+        </p:txBody>
+      </p:sp>
+      <p:cxnSp>
+        <p:nvCxnSpPr>
+          <p:cNvPr id="10" name="Connector: Elbow 9">
+            <a:extLst>
+              <a:ext uri="{FF2B5EF4-FFF2-40B4-BE49-F238E27FC236}">
+                <a16:creationId xmlns:a16="http://schemas.microsoft.com/office/drawing/2014/main" id="{4E969745-81B1-417A-B4AC-15FC7D1759D5}"/>
+              </a:ext>
+            </a:extLst>
+          </p:cNvPr>
+          <p:cNvCxnSpPr>
+            <a:cxnSpLocks/>
+            <a:stCxn id="29" idx="2"/>
+            <a:endCxn id="30" idx="0"/>
+          </p:cNvCxnSpPr>
+          <p:nvPr/>
+        </p:nvCxnSpPr>
+        <p:spPr>
+          <a:xfrm rot="5400000">
+            <a:off x="4560399" y="2151819"/>
+            <a:ext cx="470458" cy="2083904"/>
+          </a:xfrm>
+          <a:prstGeom prst="bentConnector3">
+            <a:avLst/>
+          </a:prstGeom>
+          <a:ln>
+            <a:tailEnd type="triangle"/>
+          </a:ln>
+        </p:spPr>
+        <p:style>
+          <a:lnRef idx="1">
+            <a:schemeClr val="accent1"/>
+          </a:lnRef>
+          <a:fillRef idx="0">
+            <a:schemeClr val="accent1"/>
+          </a:fillRef>
+          <a:effectRef idx="0">
+            <a:schemeClr val="accent1"/>
+          </a:effectRef>
+          <a:fontRef idx="minor">
+            <a:schemeClr val="tx1"/>
+          </a:fontRef>
+        </p:style>
+      </p:cxnSp>
+      <p:cxnSp>
+        <p:nvCxnSpPr>
+          <p:cNvPr id="39" name="Connector: Elbow 38">
+            <a:extLst>
+              <a:ext uri="{FF2B5EF4-FFF2-40B4-BE49-F238E27FC236}">
+                <a16:creationId xmlns:a16="http://schemas.microsoft.com/office/drawing/2014/main" id="{863FD2A2-FCD7-4791-8191-4294396D3F05}"/>
+              </a:ext>
+            </a:extLst>
+          </p:cNvPr>
+          <p:cNvCxnSpPr>
+            <a:cxnSpLocks/>
+            <a:endCxn id="36" idx="0"/>
+          </p:cNvCxnSpPr>
+          <p:nvPr/>
+        </p:nvCxnSpPr>
+        <p:spPr>
+          <a:xfrm>
+            <a:off x="5837580" y="3193771"/>
+            <a:ext cx="1835427" cy="255106"/>
+          </a:xfrm>
+          <a:prstGeom prst="bentConnector2">
+            <a:avLst/>
+          </a:prstGeom>
+          <a:ln>
+            <a:tailEnd type="triangle"/>
+          </a:ln>
+        </p:spPr>
+        <p:style>
+          <a:lnRef idx="1">
+            <a:schemeClr val="accent1"/>
+          </a:lnRef>
+          <a:fillRef idx="0">
+            <a:schemeClr val="accent1"/>
+          </a:fillRef>
+          <a:effectRef idx="0">
+            <a:schemeClr val="accent1"/>
+          </a:effectRef>
+          <a:fontRef idx="minor">
+            <a:schemeClr val="tx1"/>
+          </a:fontRef>
+        </p:style>
+      </p:cxnSp>
+      <p:sp>
+        <p:nvSpPr>
+          <p:cNvPr id="57" name="Rectangle 56">
+            <a:extLst>
+              <a:ext uri="{FF2B5EF4-FFF2-40B4-BE49-F238E27FC236}">
+                <a16:creationId xmlns:a16="http://schemas.microsoft.com/office/drawing/2014/main" id="{C02AA9EE-E005-4771-856A-5B3A6E9E9875}"/>
+              </a:ext>
+            </a:extLst>
+          </p:cNvPr>
+          <p:cNvSpPr/>
+          <p:nvPr/>
+        </p:nvSpPr>
+        <p:spPr>
+          <a:xfrm>
+            <a:off x="4350023" y="4660041"/>
+            <a:ext cx="2405270" cy="596346"/>
+          </a:xfrm>
+          <a:prstGeom prst="rect">
+            <a:avLst/>
+          </a:prstGeom>
+        </p:spPr>
+        <p:style>
+          <a:lnRef idx="2">
+            <a:schemeClr val="accent1">
+              <a:shade val="50000"/>
+            </a:schemeClr>
+          </a:lnRef>
+          <a:fillRef idx="1">
+            <a:schemeClr val="accent1"/>
+          </a:fillRef>
+          <a:effectRef idx="0">
+            <a:schemeClr val="accent1"/>
+          </a:effectRef>
+          <a:fontRef idx="minor">
+            <a:schemeClr val="lt1"/>
+          </a:fontRef>
+        </p:style>
+        <p:txBody>
+          <a:bodyPr rtlCol="0" anchor="ctr"/>
+          <a:lstStyle/>
+          <a:p>
+            <a:pPr algn="ctr"/>
+            <a:r>
+              <a:rPr lang="en-US" dirty="0"/>
+              <a:t>Person List</a:t>
+            </a:r>
+          </a:p>
+        </p:txBody>
+      </p:sp>
+      <p:sp>
+        <p:nvSpPr>
+          <p:cNvPr id="59" name="Rectangle 58">
+            <a:extLst>
+              <a:ext uri="{FF2B5EF4-FFF2-40B4-BE49-F238E27FC236}">
+                <a16:creationId xmlns:a16="http://schemas.microsoft.com/office/drawing/2014/main" id="{015AFB14-0F0D-4A76-B315-9FC7A73EE0BD}"/>
+              </a:ext>
+            </a:extLst>
+          </p:cNvPr>
+          <p:cNvSpPr/>
+          <p:nvPr/>
+        </p:nvSpPr>
+        <p:spPr>
+          <a:xfrm>
+            <a:off x="4350023" y="5534683"/>
+            <a:ext cx="2405270" cy="596346"/>
+          </a:xfrm>
+          <a:prstGeom prst="rect">
+            <a:avLst/>
+          </a:prstGeom>
+        </p:spPr>
+        <p:style>
+          <a:lnRef idx="2">
+            <a:schemeClr val="accent1">
+              <a:shade val="50000"/>
+            </a:schemeClr>
+          </a:lnRef>
+          <a:fillRef idx="1">
+            <a:schemeClr val="accent1"/>
+          </a:fillRef>
+          <a:effectRef idx="0">
+            <a:schemeClr val="accent1"/>
+          </a:effectRef>
+          <a:fontRef idx="minor">
+            <a:schemeClr val="lt1"/>
+          </a:fontRef>
+        </p:style>
+        <p:txBody>
+          <a:bodyPr rtlCol="0" anchor="ctr"/>
+          <a:lstStyle/>
+          <a:p>
+            <a:pPr algn="ctr"/>
+            <a:r>
+              <a:rPr lang="en-US" dirty="0"/>
+              <a:t>Person Details</a:t>
+            </a:r>
+          </a:p>
+        </p:txBody>
+      </p:sp>
+      <p:cxnSp>
+        <p:nvCxnSpPr>
+          <p:cNvPr id="21" name="Connector: Elbow 20">
+            <a:extLst>
+              <a:ext uri="{FF2B5EF4-FFF2-40B4-BE49-F238E27FC236}">
+                <a16:creationId xmlns:a16="http://schemas.microsoft.com/office/drawing/2014/main" id="{B8277195-EA12-42E1-BACA-DAB3EDDD63E0}"/>
+              </a:ext>
+            </a:extLst>
+          </p:cNvPr>
+          <p:cNvCxnSpPr>
+            <a:cxnSpLocks/>
+            <a:stCxn id="30" idx="2"/>
+            <a:endCxn id="57" idx="0"/>
+          </p:cNvCxnSpPr>
+          <p:nvPr/>
+        </p:nvCxnSpPr>
+        <p:spPr>
+          <a:xfrm rot="16200000" flipH="1">
+            <a:off x="4335820" y="3443202"/>
+            <a:ext cx="634695" cy="1798982"/>
+          </a:xfrm>
+          <a:prstGeom prst="bentConnector3">
+            <a:avLst/>
+          </a:prstGeom>
+          <a:ln>
+            <a:tailEnd type="triangle"/>
+          </a:ln>
+        </p:spPr>
+        <p:style>
+          <a:lnRef idx="1">
+            <a:schemeClr val="accent1"/>
+          </a:lnRef>
+          <a:fillRef idx="0">
+            <a:schemeClr val="accent1"/>
+          </a:fillRef>
+          <a:effectRef idx="0">
+            <a:schemeClr val="accent1"/>
+          </a:effectRef>
+          <a:fontRef idx="minor">
+            <a:schemeClr val="tx1"/>
+          </a:fontRef>
+        </p:style>
+      </p:cxnSp>
+      <p:cxnSp>
+        <p:nvCxnSpPr>
+          <p:cNvPr id="60" name="Connector: Elbow 59">
+            <a:extLst>
+              <a:ext uri="{FF2B5EF4-FFF2-40B4-BE49-F238E27FC236}">
+                <a16:creationId xmlns:a16="http://schemas.microsoft.com/office/drawing/2014/main" id="{E338BA1C-2C0F-4B67-9AB1-AA16796870D6}"/>
+              </a:ext>
+            </a:extLst>
+          </p:cNvPr>
+          <p:cNvCxnSpPr>
+            <a:cxnSpLocks/>
+            <a:stCxn id="36" idx="2"/>
+            <a:endCxn id="57" idx="0"/>
+          </p:cNvCxnSpPr>
+          <p:nvPr/>
+        </p:nvCxnSpPr>
+        <p:spPr>
+          <a:xfrm rot="5400000">
+            <a:off x="6305424" y="3292458"/>
+            <a:ext cx="614818" cy="2120349"/>
+          </a:xfrm>
+          <a:prstGeom prst="bentConnector3">
+            <a:avLst>
+              <a:gd name="adj1" fmla="val 50000"/>
+            </a:avLst>
+          </a:prstGeom>
+          <a:ln>
+            <a:tailEnd type="triangle"/>
+          </a:ln>
+        </p:spPr>
+        <p:style>
+          <a:lnRef idx="1">
+            <a:schemeClr val="accent1"/>
+          </a:lnRef>
+          <a:fillRef idx="0">
+            <a:schemeClr val="accent1"/>
+          </a:fillRef>
+          <a:effectRef idx="0">
+            <a:schemeClr val="accent1"/>
+          </a:effectRef>
+          <a:fontRef idx="minor">
+            <a:schemeClr val="tx1"/>
+          </a:fontRef>
+        </p:style>
+      </p:cxnSp>
+      <p:cxnSp>
+        <p:nvCxnSpPr>
+          <p:cNvPr id="44" name="Straight Arrow Connector 43">
+            <a:extLst>
+              <a:ext uri="{FF2B5EF4-FFF2-40B4-BE49-F238E27FC236}">
+                <a16:creationId xmlns:a16="http://schemas.microsoft.com/office/drawing/2014/main" id="{DE529CA7-8E27-433E-934D-D112F91CE8FC}"/>
+              </a:ext>
+            </a:extLst>
+          </p:cNvPr>
+          <p:cNvCxnSpPr>
+            <a:cxnSpLocks/>
+            <a:stCxn id="57" idx="2"/>
+            <a:endCxn id="59" idx="0"/>
+          </p:cNvCxnSpPr>
+          <p:nvPr/>
+        </p:nvCxnSpPr>
+        <p:spPr>
+          <a:xfrm>
+            <a:off x="5552658" y="5256387"/>
+            <a:ext cx="0" cy="278296"/>
+          </a:xfrm>
+          <a:prstGeom prst="straightConnector1">
+            <a:avLst/>
+          </a:prstGeom>
+          <a:ln>
+            <a:tailEnd type="triangle"/>
+          </a:ln>
+        </p:spPr>
+        <p:style>
+          <a:lnRef idx="1">
+            <a:schemeClr val="accent1"/>
+          </a:lnRef>
+          <a:fillRef idx="0">
+            <a:schemeClr val="accent1"/>
+          </a:fillRef>
+          <a:effectRef idx="0">
+            <a:schemeClr val="accent1"/>
+          </a:effectRef>
+          <a:fontRef idx="minor">
+            <a:schemeClr val="tx1"/>
+          </a:fontRef>
+        </p:style>
+      </p:cxnSp>
+      <p:sp>
+        <p:nvSpPr>
+          <p:cNvPr id="63" name="Rectangle 62">
+            <a:extLst>
+              <a:ext uri="{FF2B5EF4-FFF2-40B4-BE49-F238E27FC236}">
+                <a16:creationId xmlns:a16="http://schemas.microsoft.com/office/drawing/2014/main" id="{3076D9D1-36DC-465C-90D5-D69DFC4EB980}"/>
+              </a:ext>
+            </a:extLst>
+          </p:cNvPr>
+          <p:cNvSpPr/>
+          <p:nvPr/>
+        </p:nvSpPr>
+        <p:spPr>
+          <a:xfrm>
+            <a:off x="3301445" y="4512742"/>
+            <a:ext cx="4502426" cy="2043882"/>
+          </a:xfrm>
+          <a:prstGeom prst="rect">
+            <a:avLst/>
+          </a:prstGeom>
+          <a:solidFill>
+            <a:schemeClr val="accent6">
+              <a:lumMod val="20000"/>
+              <a:lumOff val="80000"/>
+              <a:alpha val="51000"/>
+            </a:schemeClr>
+          </a:solidFill>
+          <a:ln>
+            <a:noFill/>
+          </a:ln>
+        </p:spPr>
+        <p:style>
+          <a:lnRef idx="0">
+            <a:scrgbClr r="0" g="0" b="0"/>
+          </a:lnRef>
+          <a:fillRef idx="0">
+            <a:scrgbClr r="0" g="0" b="0"/>
+          </a:fillRef>
+          <a:effectRef idx="0">
+            <a:scrgbClr r="0" g="0" b="0"/>
+          </a:effectRef>
+          <a:fontRef idx="minor">
+            <a:schemeClr val="lt1"/>
+          </a:fontRef>
+        </p:style>
+        <p:txBody>
+          <a:bodyPr rtlCol="0" anchor="ctr"/>
+          <a:lstStyle/>
+          <a:p>
+            <a:pPr algn="ctr"/>
+            <a:endParaRPr lang="en-US"/>
+          </a:p>
+        </p:txBody>
+      </p:sp>
+      <p:cxnSp>
+        <p:nvCxnSpPr>
+          <p:cNvPr id="65" name="Straight Arrow Connector 64">
+            <a:extLst>
+              <a:ext uri="{FF2B5EF4-FFF2-40B4-BE49-F238E27FC236}">
+                <a16:creationId xmlns:a16="http://schemas.microsoft.com/office/drawing/2014/main" id="{A8CD2B25-0325-48A1-A361-76A25D0B388C}"/>
+              </a:ext>
+            </a:extLst>
+          </p:cNvPr>
+          <p:cNvCxnSpPr>
+            <a:cxnSpLocks/>
+            <a:endCxn id="63" idx="1"/>
+          </p:cNvCxnSpPr>
+          <p:nvPr/>
+        </p:nvCxnSpPr>
+        <p:spPr>
+          <a:xfrm>
+            <a:off x="2276061" y="5534683"/>
+            <a:ext cx="1025384" cy="0"/>
+          </a:xfrm>
+          <a:prstGeom prst="straightConnector1">
+            <a:avLst/>
+          </a:prstGeom>
+          <a:ln>
+            <a:tailEnd type="triangle"/>
+          </a:ln>
+        </p:spPr>
+        <p:style>
+          <a:lnRef idx="1">
+            <a:schemeClr val="accent1"/>
+          </a:lnRef>
+          <a:fillRef idx="0">
+            <a:schemeClr val="accent1"/>
+          </a:fillRef>
+          <a:effectRef idx="0">
+            <a:schemeClr val="accent1"/>
+          </a:effectRef>
+          <a:fontRef idx="minor">
+            <a:schemeClr val="tx1"/>
+          </a:fontRef>
+        </p:style>
+      </p:cxnSp>
+      <p:sp>
+        <p:nvSpPr>
+          <p:cNvPr id="67" name="TextBox 66">
+            <a:extLst>
+              <a:ext uri="{FF2B5EF4-FFF2-40B4-BE49-F238E27FC236}">
+                <a16:creationId xmlns:a16="http://schemas.microsoft.com/office/drawing/2014/main" id="{7056178C-9ACE-4F50-95A7-9C5BB3787E2C}"/>
+              </a:ext>
+            </a:extLst>
+          </p:cNvPr>
+          <p:cNvSpPr txBox="1"/>
+          <p:nvPr/>
+        </p:nvSpPr>
+        <p:spPr>
+          <a:xfrm>
+            <a:off x="1212573" y="5234808"/>
+            <a:ext cx="1333498" cy="646331"/>
+          </a:xfrm>
+          <a:prstGeom prst="rect">
+            <a:avLst/>
+          </a:prstGeom>
+          <a:noFill/>
+        </p:spPr>
+        <p:txBody>
+          <a:bodyPr wrap="square" rtlCol="0">
+            <a:spAutoFit/>
+          </a:bodyPr>
+          <a:lstStyle/>
+          <a:p>
+            <a:r>
+              <a:rPr lang="en-US" dirty="0"/>
+              <a:t>Shared Module</a:t>
+            </a:r>
+          </a:p>
+        </p:txBody>
+      </p:sp>
+      <p:sp>
+        <p:nvSpPr>
+          <p:cNvPr id="69" name="Rectangle 68">
+            <a:extLst>
+              <a:ext uri="{FF2B5EF4-FFF2-40B4-BE49-F238E27FC236}">
+                <a16:creationId xmlns:a16="http://schemas.microsoft.com/office/drawing/2014/main" id="{175695A7-0AB7-4749-9694-C792B4067CBA}"/>
+              </a:ext>
+            </a:extLst>
+          </p:cNvPr>
+          <p:cNvSpPr/>
+          <p:nvPr/>
+        </p:nvSpPr>
+        <p:spPr>
+          <a:xfrm>
+            <a:off x="2206487" y="3349487"/>
+            <a:ext cx="2991678" cy="816793"/>
+          </a:xfrm>
+          <a:prstGeom prst="rect">
+            <a:avLst/>
+          </a:prstGeom>
+          <a:solidFill>
+            <a:schemeClr val="accent6">
+              <a:alpha val="19000"/>
+            </a:schemeClr>
+          </a:solidFill>
+          <a:ln>
+            <a:noFill/>
+          </a:ln>
+        </p:spPr>
+        <p:style>
+          <a:lnRef idx="0">
+            <a:scrgbClr r="0" g="0" b="0"/>
+          </a:lnRef>
+          <a:fillRef idx="0">
+            <a:scrgbClr r="0" g="0" b="0"/>
+          </a:fillRef>
+          <a:effectRef idx="0">
+            <a:scrgbClr r="0" g="0" b="0"/>
+          </a:effectRef>
+          <a:fontRef idx="minor">
+            <a:schemeClr val="lt1"/>
+          </a:fontRef>
+        </p:style>
+        <p:txBody>
+          <a:bodyPr rtlCol="0" anchor="ctr"/>
+          <a:lstStyle/>
+          <a:p>
+            <a:pPr algn="ctr"/>
+            <a:endParaRPr lang="en-US" dirty="0"/>
+          </a:p>
+        </p:txBody>
+      </p:sp>
+      <p:cxnSp>
+        <p:nvCxnSpPr>
+          <p:cNvPr id="71" name="Straight Arrow Connector 70">
+            <a:extLst>
+              <a:ext uri="{FF2B5EF4-FFF2-40B4-BE49-F238E27FC236}">
+                <a16:creationId xmlns:a16="http://schemas.microsoft.com/office/drawing/2014/main" id="{DA4DCB36-5D32-444F-9371-C691737C639F}"/>
+              </a:ext>
+            </a:extLst>
+          </p:cNvPr>
+          <p:cNvCxnSpPr>
+            <a:cxnSpLocks/>
+            <a:endCxn id="69" idx="1"/>
+          </p:cNvCxnSpPr>
+          <p:nvPr/>
+        </p:nvCxnSpPr>
+        <p:spPr>
+          <a:xfrm>
+            <a:off x="1633327" y="3757884"/>
+            <a:ext cx="573160" cy="0"/>
+          </a:xfrm>
+          <a:prstGeom prst="straightConnector1">
+            <a:avLst/>
+          </a:prstGeom>
+          <a:ln>
+            <a:tailEnd type="triangle"/>
+          </a:ln>
+        </p:spPr>
+        <p:style>
+          <a:lnRef idx="1">
+            <a:schemeClr val="accent1"/>
+          </a:lnRef>
+          <a:fillRef idx="0">
+            <a:schemeClr val="accent1"/>
+          </a:fillRef>
+          <a:effectRef idx="0">
+            <a:schemeClr val="accent1"/>
+          </a:effectRef>
+          <a:fontRef idx="minor">
+            <a:schemeClr val="tx1"/>
+          </a:fontRef>
+        </p:style>
+      </p:cxnSp>
+      <p:sp>
+        <p:nvSpPr>
+          <p:cNvPr id="73" name="TextBox 72">
+            <a:extLst>
+              <a:ext uri="{FF2B5EF4-FFF2-40B4-BE49-F238E27FC236}">
+                <a16:creationId xmlns:a16="http://schemas.microsoft.com/office/drawing/2014/main" id="{9048C822-BFDA-462A-9035-3F96C5B02EAA}"/>
+              </a:ext>
+            </a:extLst>
+          </p:cNvPr>
+          <p:cNvSpPr txBox="1"/>
+          <p:nvPr/>
+        </p:nvSpPr>
+        <p:spPr>
+          <a:xfrm>
+            <a:off x="526764" y="3398892"/>
+            <a:ext cx="1136380" cy="646331"/>
+          </a:xfrm>
+          <a:prstGeom prst="rect">
+            <a:avLst/>
+          </a:prstGeom>
+          <a:noFill/>
+        </p:spPr>
+        <p:txBody>
+          <a:bodyPr wrap="square" rtlCol="0">
+            <a:spAutoFit/>
+          </a:bodyPr>
+          <a:lstStyle/>
+          <a:p>
+            <a:r>
+              <a:rPr lang="en-US" dirty="0"/>
+              <a:t>Employee Module</a:t>
+            </a:r>
+          </a:p>
+        </p:txBody>
+      </p:sp>
+      <p:sp>
+        <p:nvSpPr>
+          <p:cNvPr id="74" name="Rectangle 73">
+            <a:extLst>
+              <a:ext uri="{FF2B5EF4-FFF2-40B4-BE49-F238E27FC236}">
+                <a16:creationId xmlns:a16="http://schemas.microsoft.com/office/drawing/2014/main" id="{789E0471-5D31-464F-AC2D-0366D11513AC}"/>
+              </a:ext>
+            </a:extLst>
+          </p:cNvPr>
+          <p:cNvSpPr/>
+          <p:nvPr/>
+        </p:nvSpPr>
+        <p:spPr>
+          <a:xfrm>
+            <a:off x="6202017" y="3359136"/>
+            <a:ext cx="2991678" cy="816793"/>
+          </a:xfrm>
+          <a:prstGeom prst="rect">
+            <a:avLst/>
+          </a:prstGeom>
+          <a:solidFill>
+            <a:schemeClr val="accent6">
+              <a:alpha val="32000"/>
+            </a:schemeClr>
+          </a:solidFill>
+          <a:ln>
+            <a:noFill/>
+          </a:ln>
+        </p:spPr>
+        <p:style>
+          <a:lnRef idx="0">
+            <a:scrgbClr r="0" g="0" b="0"/>
+          </a:lnRef>
+          <a:fillRef idx="0">
+            <a:scrgbClr r="0" g="0" b="0"/>
+          </a:fillRef>
+          <a:effectRef idx="0">
+            <a:scrgbClr r="0" g="0" b="0"/>
+          </a:effectRef>
+          <a:fontRef idx="minor">
+            <a:schemeClr val="lt1"/>
+          </a:fontRef>
+        </p:style>
+        <p:txBody>
+          <a:bodyPr rtlCol="0" anchor="ctr"/>
+          <a:lstStyle/>
+          <a:p>
+            <a:pPr algn="ctr"/>
+            <a:endParaRPr lang="en-US"/>
+          </a:p>
+        </p:txBody>
+      </p:sp>
+      <p:sp>
+        <p:nvSpPr>
+          <p:cNvPr id="75" name="TextBox 74">
+            <a:extLst>
+              <a:ext uri="{FF2B5EF4-FFF2-40B4-BE49-F238E27FC236}">
+                <a16:creationId xmlns:a16="http://schemas.microsoft.com/office/drawing/2014/main" id="{6C37E75A-92F4-4E98-A04F-E11844ECCB7E}"/>
+              </a:ext>
+            </a:extLst>
+          </p:cNvPr>
+          <p:cNvSpPr txBox="1"/>
+          <p:nvPr/>
+        </p:nvSpPr>
+        <p:spPr>
+          <a:xfrm>
+            <a:off x="9992138" y="3451899"/>
+            <a:ext cx="1136380" cy="646331"/>
+          </a:xfrm>
+          <a:prstGeom prst="rect">
+            <a:avLst/>
+          </a:prstGeom>
+          <a:noFill/>
+        </p:spPr>
+        <p:txBody>
+          <a:bodyPr wrap="square" rtlCol="0">
+            <a:spAutoFit/>
+          </a:bodyPr>
+          <a:lstStyle/>
+          <a:p>
+            <a:r>
+              <a:rPr lang="en-US" dirty="0"/>
+              <a:t>Manager Module</a:t>
+            </a:r>
+          </a:p>
+        </p:txBody>
+      </p:sp>
+      <p:cxnSp>
+        <p:nvCxnSpPr>
+          <p:cNvPr id="77" name="Straight Arrow Connector 76">
+            <a:extLst>
+              <a:ext uri="{FF2B5EF4-FFF2-40B4-BE49-F238E27FC236}">
+                <a16:creationId xmlns:a16="http://schemas.microsoft.com/office/drawing/2014/main" id="{70954D12-7048-467D-9951-412FCC7D3C12}"/>
+              </a:ext>
+            </a:extLst>
+          </p:cNvPr>
+          <p:cNvCxnSpPr>
+            <a:stCxn id="75" idx="1"/>
+            <a:endCxn id="74" idx="3"/>
+          </p:cNvCxnSpPr>
+          <p:nvPr/>
+        </p:nvCxnSpPr>
+        <p:spPr>
+          <a:xfrm flipH="1" flipV="1">
+            <a:off x="9193695" y="3767533"/>
+            <a:ext cx="798443" cy="7532"/>
+          </a:xfrm>
+          <a:prstGeom prst="straightConnector1">
+            <a:avLst/>
+          </a:prstGeom>
+          <a:ln>
+            <a:tailEnd type="triangle"/>
+          </a:ln>
+        </p:spPr>
+        <p:style>
+          <a:lnRef idx="1">
+            <a:schemeClr val="accent1"/>
+          </a:lnRef>
+          <a:fillRef idx="0">
+            <a:schemeClr val="accent1"/>
+          </a:fillRef>
+          <a:effectRef idx="0">
+            <a:schemeClr val="accent1"/>
+          </a:effectRef>
+          <a:fontRef idx="minor">
+            <a:schemeClr val="tx1"/>
+          </a:fontRef>
+        </p:style>
+      </p:cxnSp>
+    </p:spTree>
+    <p:extLst>
+      <p:ext uri="{BB962C8B-B14F-4D97-AF65-F5344CB8AC3E}">
+        <p14:creationId xmlns:p14="http://schemas.microsoft.com/office/powerpoint/2010/main" val="2036966995"/>
       </p:ext>
     </p:extLst>
   </p:cSld>

</xml_diff>